<commit_message>
nazir mohammad ali khan baba warkadanngg
nazir mohammad ali khan baba warkadanngg
</commit_message>
<xml_diff>
--- a/Group 3 – FCEPH.pptx
+++ b/Group 3 – FCEPH.pptx
@@ -1,6 +1,6 @@
 
 <file path=ppt/presentation.xml><?xml version="1.0" encoding="utf-8"?>
-<p:presentation xmlns:a="http://schemas.openxmlformats.org/drawingml/2006/main" xmlns:r="http://schemas.openxmlformats.org/officeDocument/2006/relationships" xmlns:p="http://schemas.openxmlformats.org/presentationml/2006/main" autoCompressPictures="0">
+<p:presentation xmlns:a="http://schemas.openxmlformats.org/drawingml/2006/main" xmlns:r="http://schemas.openxmlformats.org/officeDocument/2006/relationships" xmlns:p="http://schemas.openxmlformats.org/presentationml/2006/main" saveSubsetFonts="1" autoCompressPictures="0">
   <p:sldMasterIdLst>
     <p:sldMasterId id="2147483798" r:id="rId1"/>
   </p:sldMasterIdLst>
@@ -1894,7 +1894,7 @@
             <a:fld id="{B61BEF0D-F0BB-DE4B-95CE-6DB70DBA9567}" type="datetimeFigureOut">
               <a:rPr lang="en-US" smtClean="0"/>
               <a:pPr/>
-              <a:t>2/20/2017</a:t>
+              <a:t>2/20/17</a:t>
             </a:fld>
             <a:endParaRPr lang="en-US" dirty="0"/>
           </a:p>
@@ -2117,7 +2117,7 @@
             <a:fld id="{B61BEF0D-F0BB-DE4B-95CE-6DB70DBA9567}" type="datetimeFigureOut">
               <a:rPr lang="en-US" smtClean="0"/>
               <a:pPr/>
-              <a:t>2/20/2017</a:t>
+              <a:t>2/20/17</a:t>
             </a:fld>
             <a:endParaRPr lang="en-US" dirty="0"/>
           </a:p>
@@ -2299,7 +2299,7 @@
             <a:fld id="{B61BEF0D-F0BB-DE4B-95CE-6DB70DBA9567}" type="datetimeFigureOut">
               <a:rPr lang="en-US" smtClean="0"/>
               <a:pPr/>
-              <a:t>2/20/2017</a:t>
+              <a:t>2/20/17</a:t>
             </a:fld>
             <a:endParaRPr lang="en-US" dirty="0"/>
           </a:p>
@@ -2471,7 +2471,7 @@
             <a:fld id="{B61BEF0D-F0BB-DE4B-95CE-6DB70DBA9567}" type="datetimeFigureOut">
               <a:rPr lang="en-US" smtClean="0"/>
               <a:pPr/>
-              <a:t>2/20/2017</a:t>
+              <a:t>2/20/17</a:t>
             </a:fld>
             <a:endParaRPr lang="en-US" dirty="0"/>
           </a:p>
@@ -2724,7 +2724,7 @@
             <a:fld id="{B61BEF0D-F0BB-DE4B-95CE-6DB70DBA9567}" type="datetimeFigureOut">
               <a:rPr lang="en-US" smtClean="0"/>
               <a:pPr/>
-              <a:t>2/20/2017</a:t>
+              <a:t>2/20/17</a:t>
             </a:fld>
             <a:endParaRPr lang="en-US" dirty="0"/>
           </a:p>
@@ -3049,7 +3049,7 @@
             <a:fld id="{B61BEF0D-F0BB-DE4B-95CE-6DB70DBA9567}" type="datetimeFigureOut">
               <a:rPr lang="en-US" smtClean="0"/>
               <a:pPr/>
-              <a:t>2/20/2017</a:t>
+              <a:t>2/20/17</a:t>
             </a:fld>
             <a:endParaRPr lang="en-US" dirty="0"/>
           </a:p>
@@ -3475,7 +3475,7 @@
             <a:fld id="{B61BEF0D-F0BB-DE4B-95CE-6DB70DBA9567}" type="datetimeFigureOut">
               <a:rPr lang="en-US" smtClean="0"/>
               <a:pPr/>
-              <a:t>2/20/2017</a:t>
+              <a:t>2/20/17</a:t>
             </a:fld>
             <a:endParaRPr lang="en-US" dirty="0"/>
           </a:p>
@@ -3595,7 +3595,7 @@
             <a:fld id="{B61BEF0D-F0BB-DE4B-95CE-6DB70DBA9567}" type="datetimeFigureOut">
               <a:rPr lang="en-US" smtClean="0"/>
               <a:pPr/>
-              <a:t>2/20/2017</a:t>
+              <a:t>2/20/17</a:t>
             </a:fld>
             <a:endParaRPr lang="en-US" dirty="0"/>
           </a:p>
@@ -3692,7 +3692,7 @@
             <a:fld id="{B61BEF0D-F0BB-DE4B-95CE-6DB70DBA9567}" type="datetimeFigureOut">
               <a:rPr lang="en-US" smtClean="0"/>
               <a:pPr/>
-              <a:t>2/20/2017</a:t>
+              <a:t>2/20/17</a:t>
             </a:fld>
             <a:endParaRPr lang="en-US" dirty="0"/>
           </a:p>
@@ -3984,7 +3984,7 @@
             <a:fld id="{B61BEF0D-F0BB-DE4B-95CE-6DB70DBA9567}" type="datetimeFigureOut">
               <a:rPr lang="en-US" smtClean="0"/>
               <a:pPr/>
-              <a:t>2/20/2017</a:t>
+              <a:t>2/20/17</a:t>
             </a:fld>
             <a:endParaRPr lang="en-US" dirty="0"/>
           </a:p>
@@ -4258,7 +4258,7 @@
             <a:fld id="{B61BEF0D-F0BB-DE4B-95CE-6DB70DBA9567}" type="datetimeFigureOut">
               <a:rPr lang="en-US" smtClean="0"/>
               <a:pPr/>
-              <a:t>2/20/2017</a:t>
+              <a:t>2/20/17</a:t>
             </a:fld>
             <a:endParaRPr lang="en-US" dirty="0"/>
           </a:p>
@@ -4514,7 +4514,7 @@
             <a:fld id="{B61BEF0D-F0BB-DE4B-95CE-6DB70DBA9567}" type="datetimeFigureOut">
               <a:rPr lang="en-US" smtClean="0"/>
               <a:pPr/>
-              <a:t>2/20/2017</a:t>
+              <a:t>2/20/17</a:t>
             </a:fld>
             <a:endParaRPr lang="en-US" dirty="0"/>
           </a:p>
@@ -5683,8 +5683,8 @@
         </p:blipFill>
         <p:spPr>
           <a:xfrm>
-            <a:off x="8299938" y="4798540"/>
-            <a:ext cx="3688372" cy="1792761"/>
+            <a:off x="1143000" y="2057400"/>
+            <a:ext cx="9632851" cy="3893234"/>
           </a:xfrm>
           <a:prstGeom prst="rect">
             <a:avLst/>
@@ -5770,6 +5770,19 @@
           <a:bodyPr/>
           <a:lstStyle/>
           <a:p>
+            <a:r>
+              <a:rPr lang="en-US" dirty="0"/>
+              <a:t>This module  give us the experience of team work.</a:t>
+            </a:r>
+          </a:p>
+          <a:p>
+            <a:r>
+              <a:rPr lang="en-US" dirty="0"/>
+              <a:t>Perform individual work and participate in collective tasks</a:t>
+            </a:r>
+            <a:endParaRPr lang="en-GB" dirty="0"/>
+          </a:p>
+          <a:p>
             <a:endParaRPr lang="en-GB" dirty="0"/>
           </a:p>
         </p:txBody>
@@ -5919,13 +5932,44 @@
           </a:xfrm>
         </p:spPr>
         <p:txBody>
-          <a:bodyPr/>
-          <a:lstStyle/>
-          <a:p>
-            <a:r>
-              <a:rPr lang="en-GB" dirty="0" err="1" smtClean="0"/>
-              <a:t>gdsds</a:t>
-            </a:r>
+          <a:bodyPr>
+            <a:normAutofit/>
+          </a:bodyPr>
+          <a:lstStyle/>
+          <a:p>
+            <a:endParaRPr lang="en-GB" dirty="0" smtClean="0"/>
+          </a:p>
+          <a:p>
+            <a:r>
+              <a:rPr lang="en-GB" dirty="0" smtClean="0"/>
+              <a:t>In this project we are required to develop a project  as group of four.</a:t>
+            </a:r>
+          </a:p>
+          <a:p>
+            <a:r>
+              <a:rPr lang="en-GB" dirty="0" smtClean="0"/>
+              <a:t>Define our group ad roles </a:t>
+            </a:r>
+          </a:p>
+          <a:p>
+            <a:r>
+              <a:rPr lang="en-GB" dirty="0" smtClean="0"/>
+              <a:t>Looking at different and necessary  factors and elements required in this project.</a:t>
+            </a:r>
+          </a:p>
+          <a:p>
+            <a:r>
+              <a:rPr lang="en-GB" dirty="0" smtClean="0"/>
+              <a:t>The aim is to engage in a collaborative team</a:t>
+            </a:r>
+          </a:p>
+          <a:p>
+            <a:r>
+              <a:rPr lang="en-GB" dirty="0" smtClean="0"/>
+              <a:t>The idea is to develop an integrated information system for a supermarket.</a:t>
+            </a:r>
+          </a:p>
+          <a:p>
             <a:endParaRPr lang="en-GB" dirty="0"/>
           </a:p>
         </p:txBody>
@@ -6207,7 +6251,6 @@
               <a:rPr lang="en-GB" sz="2800" dirty="0" smtClean="0"/>
               <a:t>Documenting everything</a:t>
             </a:r>
-            <a:endParaRPr lang="en-GB" sz="2800" dirty="0" smtClean="0"/>
           </a:p>
           <a:p>
             <a:pPr lvl="1">
@@ -6238,7 +6281,6 @@
               <a:rPr lang="en-GB" sz="2800" dirty="0" smtClean="0"/>
               <a:t>Development</a:t>
             </a:r>
-            <a:endParaRPr lang="en-GB" sz="2800" dirty="0" smtClean="0"/>
           </a:p>
           <a:p>
             <a:pPr lvl="1">
@@ -6363,11 +6405,7 @@
             </a:pPr>
             <a:r>
               <a:rPr lang="en-GB" sz="2800" dirty="0" smtClean="0"/>
-              <a:t>Checking the quality of </a:t>
-            </a:r>
-            <a:r>
-              <a:rPr lang="en-GB" sz="2800" dirty="0" smtClean="0"/>
-              <a:t>work produced by the team</a:t>
+              <a:t>Checking the quality of work produced by the team</a:t>
             </a:r>
             <a:endParaRPr lang="en-GB" sz="2800" dirty="0"/>
           </a:p>
@@ -6395,11 +6433,7 @@
             </a:pPr>
             <a:r>
               <a:rPr lang="en-GB" sz="2800" dirty="0" smtClean="0"/>
-              <a:t>Creating </a:t>
-            </a:r>
-            <a:r>
-              <a:rPr lang="en-GB" sz="2800" dirty="0" smtClean="0"/>
-              <a:t>a database</a:t>
+              <a:t>Creating a database</a:t>
             </a:r>
             <a:endParaRPr lang="en-GB" sz="2800" dirty="0"/>
           </a:p>
@@ -6520,11 +6554,7 @@
             </a:pPr>
             <a:r>
               <a:rPr lang="en-GB" sz="2800" dirty="0" smtClean="0"/>
-              <a:t>Planning how the extra components will be integrated into the core </a:t>
-            </a:r>
-            <a:r>
-              <a:rPr lang="en-GB" sz="2800" dirty="0" smtClean="0"/>
-              <a:t>software</a:t>
+              <a:t>Planning how the extra components will be integrated into the core software</a:t>
             </a:r>
             <a:endParaRPr lang="en-GB" sz="2800" dirty="0"/>
           </a:p>
@@ -6639,7 +6669,6 @@
               <a:rPr lang="en-GB" sz="2400" dirty="0" smtClean="0"/>
               <a:t>Our project objective is to create an application and website for the supermarket. To accomplish this we created a project plan. This helps us set guidelines and create structure to our project and team. </a:t>
             </a:r>
-            <a:endParaRPr lang="en-GB" sz="2400" dirty="0" smtClean="0"/>
           </a:p>
           <a:p>
             <a:pPr marL="45720" indent="0">
@@ -6689,11 +6718,7 @@
             <a:pPr lvl="1"/>
             <a:r>
               <a:rPr lang="en-GB" sz="2400" dirty="0" smtClean="0"/>
-              <a:t>The </a:t>
-            </a:r>
-            <a:r>
-              <a:rPr lang="en-GB" sz="2400" dirty="0" smtClean="0"/>
-              <a:t>logo</a:t>
+              <a:t>The logo</a:t>
             </a:r>
             <a:endParaRPr lang="en-GB" sz="2400" dirty="0"/>
           </a:p>
@@ -7835,7 +7860,7 @@
         </p:blipFill>
         <p:spPr>
           <a:xfrm>
-            <a:off x="-15004" y="246185"/>
+            <a:off x="0" y="302457"/>
             <a:ext cx="12207004" cy="6348046"/>
           </a:xfrm>
           <a:prstGeom prst="rect">

</xml_diff>